<commit_message>
visual aid for course overview day
</commit_message>
<xml_diff>
--- a/content/course/public-speaking/visual-aid/course-overview.pptx
+++ b/content/course/public-speaking/visual-aid/course-overview.pptx
@@ -53,7 +53,7 @@
       </p:grpSpPr>
       <p:sp>
         <p:nvSpPr>
-          <p:cNvPr id="26" name="PlaceHolder 1"/>
+          <p:cNvPr id="23" name="PlaceHolder 1"/>
           <p:cNvSpPr>
             <a:spLocks noGrp="1"/>
           </p:cNvSpPr>
@@ -63,8 +63,8 @@
         </p:nvSpPr>
         <p:spPr>
           <a:xfrm>
-            <a:off x="503640" y="225720"/>
-            <a:ext cx="9068760" cy="946440"/>
+            <a:off x="503640" y="226080"/>
+            <a:ext cx="9069120" cy="946080"/>
           </a:xfrm>
           <a:prstGeom prst="rect">
             <a:avLst/>
@@ -82,7 +82,7 @@
       </p:sp>
       <p:sp>
         <p:nvSpPr>
-          <p:cNvPr id="27" name="PlaceHolder 2"/>
+          <p:cNvPr id="24" name="PlaceHolder 2"/>
           <p:cNvSpPr>
             <a:spLocks noGrp="1"/>
           </p:cNvSpPr>
@@ -93,37 +93,37 @@
         <p:spPr>
           <a:xfrm>
             <a:off x="503640" y="1326240"/>
-            <a:ext cx="9068760" cy="1568160"/>
-          </a:xfrm>
-          <a:prstGeom prst="rect">
-            <a:avLst/>
-          </a:prstGeom>
-        </p:spPr>
-        <p:txBody>
-          <a:bodyPr lIns="0" rIns="0" tIns="0" bIns="0">
-            <a:normAutofit/>
-          </a:bodyPr>
-          <a:p>
-            <a:endParaRPr b="0" lang="en-US" sz="3200" spc="-1" strike="noStrike">
-              <a:latin typeface="Arial"/>
-            </a:endParaRPr>
-          </a:p>
-        </p:txBody>
-      </p:sp>
-      <p:sp>
-        <p:nvSpPr>
-          <p:cNvPr id="28" name="PlaceHolder 3"/>
-          <p:cNvSpPr>
-            <a:spLocks noGrp="1"/>
-          </p:cNvSpPr>
-          <p:nvPr>
-            <p:ph type="body"/>
-          </p:nvPr>
-        </p:nvSpPr>
-        <p:spPr>
-          <a:xfrm>
-            <a:off x="503640" y="3043800"/>
-            <a:ext cx="9068760" cy="1568160"/>
+            <a:ext cx="9069120" cy="1567800"/>
+          </a:xfrm>
+          <a:prstGeom prst="rect">
+            <a:avLst/>
+          </a:prstGeom>
+        </p:spPr>
+        <p:txBody>
+          <a:bodyPr lIns="0" rIns="0" tIns="0" bIns="0">
+            <a:normAutofit/>
+          </a:bodyPr>
+          <a:p>
+            <a:endParaRPr b="0" lang="en-US" sz="3200" spc="-1" strike="noStrike">
+              <a:latin typeface="Arial"/>
+            </a:endParaRPr>
+          </a:p>
+        </p:txBody>
+      </p:sp>
+      <p:sp>
+        <p:nvSpPr>
+          <p:cNvPr id="25" name="PlaceHolder 3"/>
+          <p:cNvSpPr>
+            <a:spLocks noGrp="1"/>
+          </p:cNvSpPr>
+          <p:nvPr>
+            <p:ph type="body"/>
+          </p:nvPr>
+        </p:nvSpPr>
+        <p:spPr>
+          <a:xfrm>
+            <a:off x="503640" y="3043440"/>
+            <a:ext cx="9069120" cy="1567800"/>
           </a:xfrm>
           <a:prstGeom prst="rect">
             <a:avLst/>
@@ -164,7 +164,7 @@
       </p:grpSpPr>
       <p:sp>
         <p:nvSpPr>
-          <p:cNvPr id="29" name="PlaceHolder 1"/>
+          <p:cNvPr id="26" name="PlaceHolder 1"/>
           <p:cNvSpPr>
             <a:spLocks noGrp="1"/>
           </p:cNvSpPr>
@@ -174,8 +174,8 @@
         </p:nvSpPr>
         <p:spPr>
           <a:xfrm>
-            <a:off x="503640" y="225720"/>
-            <a:ext cx="9068760" cy="946440"/>
+            <a:off x="503640" y="226080"/>
+            <a:ext cx="9069120" cy="946080"/>
           </a:xfrm>
           <a:prstGeom prst="rect">
             <a:avLst/>
@@ -193,7 +193,7 @@
       </p:sp>
       <p:sp>
         <p:nvSpPr>
-          <p:cNvPr id="30" name="PlaceHolder 2"/>
+          <p:cNvPr id="27" name="PlaceHolder 2"/>
           <p:cNvSpPr>
             <a:spLocks noGrp="1"/>
           </p:cNvSpPr>
@@ -204,26 +204,26 @@
         <p:spPr>
           <a:xfrm>
             <a:off x="503640" y="1326240"/>
-            <a:ext cx="4425480" cy="1568160"/>
-          </a:xfrm>
-          <a:prstGeom prst="rect">
-            <a:avLst/>
-          </a:prstGeom>
-        </p:spPr>
-        <p:txBody>
-          <a:bodyPr lIns="0" rIns="0" tIns="0" bIns="0">
-            <a:normAutofit/>
-          </a:bodyPr>
-          <a:p>
-            <a:endParaRPr b="0" lang="en-US" sz="3200" spc="-1" strike="noStrike">
-              <a:latin typeface="Arial"/>
-            </a:endParaRPr>
-          </a:p>
-        </p:txBody>
-      </p:sp>
-      <p:sp>
-        <p:nvSpPr>
-          <p:cNvPr id="31" name="PlaceHolder 3"/>
+            <a:ext cx="4425480" cy="1567800"/>
+          </a:xfrm>
+          <a:prstGeom prst="rect">
+            <a:avLst/>
+          </a:prstGeom>
+        </p:spPr>
+        <p:txBody>
+          <a:bodyPr lIns="0" rIns="0" tIns="0" bIns="0">
+            <a:normAutofit/>
+          </a:bodyPr>
+          <a:p>
+            <a:endParaRPr b="0" lang="en-US" sz="3200" spc="-1" strike="noStrike">
+              <a:latin typeface="Arial"/>
+            </a:endParaRPr>
+          </a:p>
+        </p:txBody>
+      </p:sp>
+      <p:sp>
+        <p:nvSpPr>
+          <p:cNvPr id="28" name="PlaceHolder 3"/>
           <p:cNvSpPr>
             <a:spLocks noGrp="1"/>
           </p:cNvSpPr>
@@ -234,67 +234,67 @@
         <p:spPr>
           <a:xfrm>
             <a:off x="5150880" y="1326240"/>
-            <a:ext cx="4425480" cy="1568160"/>
-          </a:xfrm>
-          <a:prstGeom prst="rect">
-            <a:avLst/>
-          </a:prstGeom>
-        </p:spPr>
-        <p:txBody>
-          <a:bodyPr lIns="0" rIns="0" tIns="0" bIns="0">
-            <a:normAutofit/>
-          </a:bodyPr>
-          <a:p>
-            <a:endParaRPr b="0" lang="en-US" sz="3200" spc="-1" strike="noStrike">
-              <a:latin typeface="Arial"/>
-            </a:endParaRPr>
-          </a:p>
-        </p:txBody>
-      </p:sp>
-      <p:sp>
-        <p:nvSpPr>
-          <p:cNvPr id="32" name="PlaceHolder 4"/>
-          <p:cNvSpPr>
-            <a:spLocks noGrp="1"/>
-          </p:cNvSpPr>
-          <p:nvPr>
-            <p:ph type="body"/>
-          </p:nvPr>
-        </p:nvSpPr>
-        <p:spPr>
-          <a:xfrm>
-            <a:off x="503640" y="3043800"/>
-            <a:ext cx="4425480" cy="1568160"/>
-          </a:xfrm>
-          <a:prstGeom prst="rect">
-            <a:avLst/>
-          </a:prstGeom>
-        </p:spPr>
-        <p:txBody>
-          <a:bodyPr lIns="0" rIns="0" tIns="0" bIns="0">
-            <a:normAutofit/>
-          </a:bodyPr>
-          <a:p>
-            <a:endParaRPr b="0" lang="en-US" sz="3200" spc="-1" strike="noStrike">
-              <a:latin typeface="Arial"/>
-            </a:endParaRPr>
-          </a:p>
-        </p:txBody>
-      </p:sp>
-      <p:sp>
-        <p:nvSpPr>
-          <p:cNvPr id="33" name="PlaceHolder 5"/>
-          <p:cNvSpPr>
-            <a:spLocks noGrp="1"/>
-          </p:cNvSpPr>
-          <p:nvPr>
-            <p:ph type="body"/>
-          </p:nvPr>
-        </p:nvSpPr>
-        <p:spPr>
-          <a:xfrm>
-            <a:off x="5150880" y="3043800"/>
-            <a:ext cx="4425480" cy="1568160"/>
+            <a:ext cx="4425480" cy="1567800"/>
+          </a:xfrm>
+          <a:prstGeom prst="rect">
+            <a:avLst/>
+          </a:prstGeom>
+        </p:spPr>
+        <p:txBody>
+          <a:bodyPr lIns="0" rIns="0" tIns="0" bIns="0">
+            <a:normAutofit/>
+          </a:bodyPr>
+          <a:p>
+            <a:endParaRPr b="0" lang="en-US" sz="3200" spc="-1" strike="noStrike">
+              <a:latin typeface="Arial"/>
+            </a:endParaRPr>
+          </a:p>
+        </p:txBody>
+      </p:sp>
+      <p:sp>
+        <p:nvSpPr>
+          <p:cNvPr id="29" name="PlaceHolder 4"/>
+          <p:cNvSpPr>
+            <a:spLocks noGrp="1"/>
+          </p:cNvSpPr>
+          <p:nvPr>
+            <p:ph type="body"/>
+          </p:nvPr>
+        </p:nvSpPr>
+        <p:spPr>
+          <a:xfrm>
+            <a:off x="503640" y="3043440"/>
+            <a:ext cx="4425480" cy="1567800"/>
+          </a:xfrm>
+          <a:prstGeom prst="rect">
+            <a:avLst/>
+          </a:prstGeom>
+        </p:spPr>
+        <p:txBody>
+          <a:bodyPr lIns="0" rIns="0" tIns="0" bIns="0">
+            <a:normAutofit/>
+          </a:bodyPr>
+          <a:p>
+            <a:endParaRPr b="0" lang="en-US" sz="3200" spc="-1" strike="noStrike">
+              <a:latin typeface="Arial"/>
+            </a:endParaRPr>
+          </a:p>
+        </p:txBody>
+      </p:sp>
+      <p:sp>
+        <p:nvSpPr>
+          <p:cNvPr id="30" name="PlaceHolder 5"/>
+          <p:cNvSpPr>
+            <a:spLocks noGrp="1"/>
+          </p:cNvSpPr>
+          <p:nvPr>
+            <p:ph type="body"/>
+          </p:nvPr>
+        </p:nvSpPr>
+        <p:spPr>
+          <a:xfrm>
+            <a:off x="5150880" y="3043440"/>
+            <a:ext cx="4425480" cy="1567800"/>
           </a:xfrm>
           <a:prstGeom prst="rect">
             <a:avLst/>
@@ -335,7 +335,7 @@
       </p:grpSpPr>
       <p:sp>
         <p:nvSpPr>
-          <p:cNvPr id="34" name="PlaceHolder 1"/>
+          <p:cNvPr id="31" name="PlaceHolder 1"/>
           <p:cNvSpPr>
             <a:spLocks noGrp="1"/>
           </p:cNvSpPr>
@@ -345,8 +345,8 @@
         </p:nvSpPr>
         <p:spPr>
           <a:xfrm>
-            <a:off x="503640" y="225720"/>
-            <a:ext cx="9068760" cy="946440"/>
+            <a:off x="503640" y="226080"/>
+            <a:ext cx="9069120" cy="946080"/>
           </a:xfrm>
           <a:prstGeom prst="rect">
             <a:avLst/>
@@ -364,7 +364,7 @@
       </p:sp>
       <p:sp>
         <p:nvSpPr>
-          <p:cNvPr id="35" name="PlaceHolder 2"/>
+          <p:cNvPr id="32" name="PlaceHolder 2"/>
           <p:cNvSpPr>
             <a:spLocks noGrp="1"/>
           </p:cNvSpPr>
@@ -375,26 +375,26 @@
         <p:spPr>
           <a:xfrm>
             <a:off x="503640" y="1326240"/>
-            <a:ext cx="2919960" cy="1568160"/>
-          </a:xfrm>
-          <a:prstGeom prst="rect">
-            <a:avLst/>
-          </a:prstGeom>
-        </p:spPr>
-        <p:txBody>
-          <a:bodyPr lIns="0" rIns="0" tIns="0" bIns="0">
-            <a:normAutofit/>
-          </a:bodyPr>
-          <a:p>
-            <a:endParaRPr b="0" lang="en-US" sz="3200" spc="-1" strike="noStrike">
-              <a:latin typeface="Arial"/>
-            </a:endParaRPr>
-          </a:p>
-        </p:txBody>
-      </p:sp>
-      <p:sp>
-        <p:nvSpPr>
-          <p:cNvPr id="36" name="PlaceHolder 3"/>
+            <a:ext cx="2919960" cy="1567800"/>
+          </a:xfrm>
+          <a:prstGeom prst="rect">
+            <a:avLst/>
+          </a:prstGeom>
+        </p:spPr>
+        <p:txBody>
+          <a:bodyPr lIns="0" rIns="0" tIns="0" bIns="0">
+            <a:normAutofit/>
+          </a:bodyPr>
+          <a:p>
+            <a:endParaRPr b="0" lang="en-US" sz="3200" spc="-1" strike="noStrike">
+              <a:latin typeface="Arial"/>
+            </a:endParaRPr>
+          </a:p>
+        </p:txBody>
+      </p:sp>
+      <p:sp>
+        <p:nvSpPr>
+          <p:cNvPr id="33" name="PlaceHolder 3"/>
           <p:cNvSpPr>
             <a:spLocks noGrp="1"/>
           </p:cNvSpPr>
@@ -405,26 +405,26 @@
         <p:spPr>
           <a:xfrm>
             <a:off x="3570120" y="1326240"/>
-            <a:ext cx="2919960" cy="1568160"/>
-          </a:xfrm>
-          <a:prstGeom prst="rect">
-            <a:avLst/>
-          </a:prstGeom>
-        </p:spPr>
-        <p:txBody>
-          <a:bodyPr lIns="0" rIns="0" tIns="0" bIns="0">
-            <a:normAutofit/>
-          </a:bodyPr>
-          <a:p>
-            <a:endParaRPr b="0" lang="en-US" sz="3200" spc="-1" strike="noStrike">
-              <a:latin typeface="Arial"/>
-            </a:endParaRPr>
-          </a:p>
-        </p:txBody>
-      </p:sp>
-      <p:sp>
-        <p:nvSpPr>
-          <p:cNvPr id="37" name="PlaceHolder 4"/>
+            <a:ext cx="2919960" cy="1567800"/>
+          </a:xfrm>
+          <a:prstGeom prst="rect">
+            <a:avLst/>
+          </a:prstGeom>
+        </p:spPr>
+        <p:txBody>
+          <a:bodyPr lIns="0" rIns="0" tIns="0" bIns="0">
+            <a:normAutofit/>
+          </a:bodyPr>
+          <a:p>
+            <a:endParaRPr b="0" lang="en-US" sz="3200" spc="-1" strike="noStrike">
+              <a:latin typeface="Arial"/>
+            </a:endParaRPr>
+          </a:p>
+        </p:txBody>
+      </p:sp>
+      <p:sp>
+        <p:nvSpPr>
+          <p:cNvPr id="34" name="PlaceHolder 4"/>
           <p:cNvSpPr>
             <a:spLocks noGrp="1"/>
           </p:cNvSpPr>
@@ -435,97 +435,97 @@
         <p:spPr>
           <a:xfrm>
             <a:off x="6636240" y="1326240"/>
-            <a:ext cx="2919960" cy="1568160"/>
-          </a:xfrm>
-          <a:prstGeom prst="rect">
-            <a:avLst/>
-          </a:prstGeom>
-        </p:spPr>
-        <p:txBody>
-          <a:bodyPr lIns="0" rIns="0" tIns="0" bIns="0">
-            <a:normAutofit/>
-          </a:bodyPr>
-          <a:p>
-            <a:endParaRPr b="0" lang="en-US" sz="3200" spc="-1" strike="noStrike">
-              <a:latin typeface="Arial"/>
-            </a:endParaRPr>
-          </a:p>
-        </p:txBody>
-      </p:sp>
-      <p:sp>
-        <p:nvSpPr>
-          <p:cNvPr id="38" name="PlaceHolder 5"/>
-          <p:cNvSpPr>
-            <a:spLocks noGrp="1"/>
-          </p:cNvSpPr>
-          <p:nvPr>
-            <p:ph type="body"/>
-          </p:nvPr>
-        </p:nvSpPr>
-        <p:spPr>
-          <a:xfrm>
-            <a:off x="503640" y="3043800"/>
-            <a:ext cx="2919960" cy="1568160"/>
-          </a:xfrm>
-          <a:prstGeom prst="rect">
-            <a:avLst/>
-          </a:prstGeom>
-        </p:spPr>
-        <p:txBody>
-          <a:bodyPr lIns="0" rIns="0" tIns="0" bIns="0">
-            <a:normAutofit/>
-          </a:bodyPr>
-          <a:p>
-            <a:endParaRPr b="0" lang="en-US" sz="3200" spc="-1" strike="noStrike">
-              <a:latin typeface="Arial"/>
-            </a:endParaRPr>
-          </a:p>
-        </p:txBody>
-      </p:sp>
-      <p:sp>
-        <p:nvSpPr>
-          <p:cNvPr id="39" name="PlaceHolder 6"/>
-          <p:cNvSpPr>
-            <a:spLocks noGrp="1"/>
-          </p:cNvSpPr>
-          <p:nvPr>
-            <p:ph type="body"/>
-          </p:nvPr>
-        </p:nvSpPr>
-        <p:spPr>
-          <a:xfrm>
-            <a:off x="3570120" y="3043800"/>
-            <a:ext cx="2919960" cy="1568160"/>
-          </a:xfrm>
-          <a:prstGeom prst="rect">
-            <a:avLst/>
-          </a:prstGeom>
-        </p:spPr>
-        <p:txBody>
-          <a:bodyPr lIns="0" rIns="0" tIns="0" bIns="0">
-            <a:normAutofit/>
-          </a:bodyPr>
-          <a:p>
-            <a:endParaRPr b="0" lang="en-US" sz="3200" spc="-1" strike="noStrike">
-              <a:latin typeface="Arial"/>
-            </a:endParaRPr>
-          </a:p>
-        </p:txBody>
-      </p:sp>
-      <p:sp>
-        <p:nvSpPr>
-          <p:cNvPr id="40" name="PlaceHolder 7"/>
-          <p:cNvSpPr>
-            <a:spLocks noGrp="1"/>
-          </p:cNvSpPr>
-          <p:nvPr>
-            <p:ph type="body"/>
-          </p:nvPr>
-        </p:nvSpPr>
-        <p:spPr>
-          <a:xfrm>
-            <a:off x="6636240" y="3043800"/>
-            <a:ext cx="2919960" cy="1568160"/>
+            <a:ext cx="2919960" cy="1567800"/>
+          </a:xfrm>
+          <a:prstGeom prst="rect">
+            <a:avLst/>
+          </a:prstGeom>
+        </p:spPr>
+        <p:txBody>
+          <a:bodyPr lIns="0" rIns="0" tIns="0" bIns="0">
+            <a:normAutofit/>
+          </a:bodyPr>
+          <a:p>
+            <a:endParaRPr b="0" lang="en-US" sz="3200" spc="-1" strike="noStrike">
+              <a:latin typeface="Arial"/>
+            </a:endParaRPr>
+          </a:p>
+        </p:txBody>
+      </p:sp>
+      <p:sp>
+        <p:nvSpPr>
+          <p:cNvPr id="35" name="PlaceHolder 5"/>
+          <p:cNvSpPr>
+            <a:spLocks noGrp="1"/>
+          </p:cNvSpPr>
+          <p:nvPr>
+            <p:ph type="body"/>
+          </p:nvPr>
+        </p:nvSpPr>
+        <p:spPr>
+          <a:xfrm>
+            <a:off x="503640" y="3043440"/>
+            <a:ext cx="2919960" cy="1567800"/>
+          </a:xfrm>
+          <a:prstGeom prst="rect">
+            <a:avLst/>
+          </a:prstGeom>
+        </p:spPr>
+        <p:txBody>
+          <a:bodyPr lIns="0" rIns="0" tIns="0" bIns="0">
+            <a:normAutofit/>
+          </a:bodyPr>
+          <a:p>
+            <a:endParaRPr b="0" lang="en-US" sz="3200" spc="-1" strike="noStrike">
+              <a:latin typeface="Arial"/>
+            </a:endParaRPr>
+          </a:p>
+        </p:txBody>
+      </p:sp>
+      <p:sp>
+        <p:nvSpPr>
+          <p:cNvPr id="36" name="PlaceHolder 6"/>
+          <p:cNvSpPr>
+            <a:spLocks noGrp="1"/>
+          </p:cNvSpPr>
+          <p:nvPr>
+            <p:ph type="body"/>
+          </p:nvPr>
+        </p:nvSpPr>
+        <p:spPr>
+          <a:xfrm>
+            <a:off x="3570120" y="3043440"/>
+            <a:ext cx="2919960" cy="1567800"/>
+          </a:xfrm>
+          <a:prstGeom prst="rect">
+            <a:avLst/>
+          </a:prstGeom>
+        </p:spPr>
+        <p:txBody>
+          <a:bodyPr lIns="0" rIns="0" tIns="0" bIns="0">
+            <a:normAutofit/>
+          </a:bodyPr>
+          <a:p>
+            <a:endParaRPr b="0" lang="en-US" sz="3200" spc="-1" strike="noStrike">
+              <a:latin typeface="Arial"/>
+            </a:endParaRPr>
+          </a:p>
+        </p:txBody>
+      </p:sp>
+      <p:sp>
+        <p:nvSpPr>
+          <p:cNvPr id="37" name="PlaceHolder 7"/>
+          <p:cNvSpPr>
+            <a:spLocks noGrp="1"/>
+          </p:cNvSpPr>
+          <p:nvPr>
+            <p:ph type="body"/>
+          </p:nvPr>
+        </p:nvSpPr>
+        <p:spPr>
+          <a:xfrm>
+            <a:off x="6636240" y="3043440"/>
+            <a:ext cx="2919960" cy="1567800"/>
           </a:xfrm>
           <a:prstGeom prst="rect">
             <a:avLst/>
@@ -566,7 +566,7 @@
       </p:grpSpPr>
       <p:sp>
         <p:nvSpPr>
-          <p:cNvPr id="5" name="PlaceHolder 1"/>
+          <p:cNvPr id="2" name="PlaceHolder 1"/>
           <p:cNvSpPr>
             <a:spLocks noGrp="1"/>
           </p:cNvSpPr>
@@ -576,8 +576,8 @@
         </p:nvSpPr>
         <p:spPr>
           <a:xfrm>
-            <a:off x="503640" y="225720"/>
-            <a:ext cx="9068760" cy="946440"/>
+            <a:off x="503640" y="226080"/>
+            <a:ext cx="9069120" cy="946080"/>
           </a:xfrm>
           <a:prstGeom prst="rect">
             <a:avLst/>
@@ -595,7 +595,7 @@
       </p:sp>
       <p:sp>
         <p:nvSpPr>
-          <p:cNvPr id="6" name="PlaceHolder 2"/>
+          <p:cNvPr id="3" name="PlaceHolder 2"/>
           <p:cNvSpPr>
             <a:spLocks noGrp="1"/>
           </p:cNvSpPr>
@@ -606,7 +606,7 @@
         <p:spPr>
           <a:xfrm>
             <a:off x="503640" y="1326240"/>
-            <a:ext cx="9068760" cy="3287880"/>
+            <a:ext cx="9069120" cy="3287520"/>
           </a:xfrm>
           <a:prstGeom prst="rect">
             <a:avLst/>
@@ -646,7 +646,7 @@
       </p:grpSpPr>
       <p:sp>
         <p:nvSpPr>
-          <p:cNvPr id="7" name="PlaceHolder 1"/>
+          <p:cNvPr id="4" name="PlaceHolder 1"/>
           <p:cNvSpPr>
             <a:spLocks noGrp="1"/>
           </p:cNvSpPr>
@@ -656,8 +656,8 @@
         </p:nvSpPr>
         <p:spPr>
           <a:xfrm>
-            <a:off x="503640" y="225720"/>
-            <a:ext cx="9068760" cy="946440"/>
+            <a:off x="503640" y="226080"/>
+            <a:ext cx="9069120" cy="946080"/>
           </a:xfrm>
           <a:prstGeom prst="rect">
             <a:avLst/>
@@ -675,7 +675,7 @@
       </p:sp>
       <p:sp>
         <p:nvSpPr>
-          <p:cNvPr id="8" name="PlaceHolder 2"/>
+          <p:cNvPr id="5" name="PlaceHolder 2"/>
           <p:cNvSpPr>
             <a:spLocks noGrp="1"/>
           </p:cNvSpPr>
@@ -686,7 +686,7 @@
         <p:spPr>
           <a:xfrm>
             <a:off x="503640" y="1326240"/>
-            <a:ext cx="9068760" cy="3287880"/>
+            <a:ext cx="9069120" cy="3287520"/>
           </a:xfrm>
           <a:prstGeom prst="rect">
             <a:avLst/>
@@ -727,7 +727,7 @@
       </p:grpSpPr>
       <p:sp>
         <p:nvSpPr>
-          <p:cNvPr id="9" name="PlaceHolder 1"/>
+          <p:cNvPr id="6" name="PlaceHolder 1"/>
           <p:cNvSpPr>
             <a:spLocks noGrp="1"/>
           </p:cNvSpPr>
@@ -737,8 +737,8 @@
         </p:nvSpPr>
         <p:spPr>
           <a:xfrm>
-            <a:off x="503640" y="225720"/>
-            <a:ext cx="9068760" cy="946440"/>
+            <a:off x="503640" y="226080"/>
+            <a:ext cx="9069120" cy="946080"/>
           </a:xfrm>
           <a:prstGeom prst="rect">
             <a:avLst/>
@@ -756,7 +756,7 @@
       </p:sp>
       <p:sp>
         <p:nvSpPr>
-          <p:cNvPr id="10" name="PlaceHolder 2"/>
+          <p:cNvPr id="7" name="PlaceHolder 2"/>
           <p:cNvSpPr>
             <a:spLocks noGrp="1"/>
           </p:cNvSpPr>
@@ -767,26 +767,26 @@
         <p:spPr>
           <a:xfrm>
             <a:off x="503640" y="1326240"/>
-            <a:ext cx="4425480" cy="3287880"/>
-          </a:xfrm>
-          <a:prstGeom prst="rect">
-            <a:avLst/>
-          </a:prstGeom>
-        </p:spPr>
-        <p:txBody>
-          <a:bodyPr lIns="0" rIns="0" tIns="0" bIns="0">
-            <a:normAutofit/>
-          </a:bodyPr>
-          <a:p>
-            <a:endParaRPr b="0" lang="en-US" sz="3200" spc="-1" strike="noStrike">
-              <a:latin typeface="Arial"/>
-            </a:endParaRPr>
-          </a:p>
-        </p:txBody>
-      </p:sp>
-      <p:sp>
-        <p:nvSpPr>
-          <p:cNvPr id="11" name="PlaceHolder 3"/>
+            <a:ext cx="4425480" cy="3287520"/>
+          </a:xfrm>
+          <a:prstGeom prst="rect">
+            <a:avLst/>
+          </a:prstGeom>
+        </p:spPr>
+        <p:txBody>
+          <a:bodyPr lIns="0" rIns="0" tIns="0" bIns="0">
+            <a:normAutofit/>
+          </a:bodyPr>
+          <a:p>
+            <a:endParaRPr b="0" lang="en-US" sz="3200" spc="-1" strike="noStrike">
+              <a:latin typeface="Arial"/>
+            </a:endParaRPr>
+          </a:p>
+        </p:txBody>
+      </p:sp>
+      <p:sp>
+        <p:nvSpPr>
+          <p:cNvPr id="8" name="PlaceHolder 3"/>
           <p:cNvSpPr>
             <a:spLocks noGrp="1"/>
           </p:cNvSpPr>
@@ -797,7 +797,7 @@
         <p:spPr>
           <a:xfrm>
             <a:off x="5150880" y="1326240"/>
-            <a:ext cx="4425480" cy="3287880"/>
+            <a:ext cx="4425480" cy="3287520"/>
           </a:xfrm>
           <a:prstGeom prst="rect">
             <a:avLst/>
@@ -838,7 +838,7 @@
       </p:grpSpPr>
       <p:sp>
         <p:nvSpPr>
-          <p:cNvPr id="12" name="PlaceHolder 1"/>
+          <p:cNvPr id="9" name="PlaceHolder 1"/>
           <p:cNvSpPr>
             <a:spLocks noGrp="1"/>
           </p:cNvSpPr>
@@ -848,8 +848,8 @@
         </p:nvSpPr>
         <p:spPr>
           <a:xfrm>
-            <a:off x="503640" y="225720"/>
-            <a:ext cx="9068760" cy="946440"/>
+            <a:off x="503640" y="226080"/>
+            <a:ext cx="9069120" cy="946080"/>
           </a:xfrm>
           <a:prstGeom prst="rect">
             <a:avLst/>
@@ -889,7 +889,7 @@
       </p:grpSpPr>
       <p:sp>
         <p:nvSpPr>
-          <p:cNvPr id="13" name="PlaceHolder 1"/>
+          <p:cNvPr id="10" name="PlaceHolder 1"/>
           <p:cNvSpPr>
             <a:spLocks noGrp="1"/>
           </p:cNvSpPr>
@@ -899,8 +899,8 @@
         </p:nvSpPr>
         <p:spPr>
           <a:xfrm>
-            <a:off x="503640" y="225720"/>
-            <a:ext cx="9068760" cy="4388400"/>
+            <a:off x="503640" y="226080"/>
+            <a:ext cx="9069120" cy="4386600"/>
           </a:xfrm>
           <a:prstGeom prst="rect">
             <a:avLst/>
@@ -940,7 +940,7 @@
       </p:grpSpPr>
       <p:sp>
         <p:nvSpPr>
-          <p:cNvPr id="14" name="PlaceHolder 1"/>
+          <p:cNvPr id="11" name="PlaceHolder 1"/>
           <p:cNvSpPr>
             <a:spLocks noGrp="1"/>
           </p:cNvSpPr>
@@ -950,8 +950,8 @@
         </p:nvSpPr>
         <p:spPr>
           <a:xfrm>
-            <a:off x="503640" y="225720"/>
-            <a:ext cx="9068760" cy="946440"/>
+            <a:off x="503640" y="226080"/>
+            <a:ext cx="9069120" cy="946080"/>
           </a:xfrm>
           <a:prstGeom prst="rect">
             <a:avLst/>
@@ -969,7 +969,7 @@
       </p:sp>
       <p:sp>
         <p:nvSpPr>
-          <p:cNvPr id="15" name="PlaceHolder 2"/>
+          <p:cNvPr id="12" name="PlaceHolder 2"/>
           <p:cNvSpPr>
             <a:spLocks noGrp="1"/>
           </p:cNvSpPr>
@@ -980,26 +980,26 @@
         <p:spPr>
           <a:xfrm>
             <a:off x="503640" y="1326240"/>
-            <a:ext cx="4425480" cy="1568160"/>
-          </a:xfrm>
-          <a:prstGeom prst="rect">
-            <a:avLst/>
-          </a:prstGeom>
-        </p:spPr>
-        <p:txBody>
-          <a:bodyPr lIns="0" rIns="0" tIns="0" bIns="0">
-            <a:normAutofit/>
-          </a:bodyPr>
-          <a:p>
-            <a:endParaRPr b="0" lang="en-US" sz="3200" spc="-1" strike="noStrike">
-              <a:latin typeface="Arial"/>
-            </a:endParaRPr>
-          </a:p>
-        </p:txBody>
-      </p:sp>
-      <p:sp>
-        <p:nvSpPr>
-          <p:cNvPr id="16" name="PlaceHolder 3"/>
+            <a:ext cx="4425480" cy="1567800"/>
+          </a:xfrm>
+          <a:prstGeom prst="rect">
+            <a:avLst/>
+          </a:prstGeom>
+        </p:spPr>
+        <p:txBody>
+          <a:bodyPr lIns="0" rIns="0" tIns="0" bIns="0">
+            <a:normAutofit/>
+          </a:bodyPr>
+          <a:p>
+            <a:endParaRPr b="0" lang="en-US" sz="3200" spc="-1" strike="noStrike">
+              <a:latin typeface="Arial"/>
+            </a:endParaRPr>
+          </a:p>
+        </p:txBody>
+      </p:sp>
+      <p:sp>
+        <p:nvSpPr>
+          <p:cNvPr id="13" name="PlaceHolder 3"/>
           <p:cNvSpPr>
             <a:spLocks noGrp="1"/>
           </p:cNvSpPr>
@@ -1010,37 +1010,37 @@
         <p:spPr>
           <a:xfrm>
             <a:off x="5150880" y="1326240"/>
-            <a:ext cx="4425480" cy="3287880"/>
-          </a:xfrm>
-          <a:prstGeom prst="rect">
-            <a:avLst/>
-          </a:prstGeom>
-        </p:spPr>
-        <p:txBody>
-          <a:bodyPr lIns="0" rIns="0" tIns="0" bIns="0">
-            <a:normAutofit/>
-          </a:bodyPr>
-          <a:p>
-            <a:endParaRPr b="0" lang="en-US" sz="3200" spc="-1" strike="noStrike">
-              <a:latin typeface="Arial"/>
-            </a:endParaRPr>
-          </a:p>
-        </p:txBody>
-      </p:sp>
-      <p:sp>
-        <p:nvSpPr>
-          <p:cNvPr id="17" name="PlaceHolder 4"/>
-          <p:cNvSpPr>
-            <a:spLocks noGrp="1"/>
-          </p:cNvSpPr>
-          <p:nvPr>
-            <p:ph type="body"/>
-          </p:nvPr>
-        </p:nvSpPr>
-        <p:spPr>
-          <a:xfrm>
-            <a:off x="503640" y="3043800"/>
-            <a:ext cx="4425480" cy="1568160"/>
+            <a:ext cx="4425480" cy="3287520"/>
+          </a:xfrm>
+          <a:prstGeom prst="rect">
+            <a:avLst/>
+          </a:prstGeom>
+        </p:spPr>
+        <p:txBody>
+          <a:bodyPr lIns="0" rIns="0" tIns="0" bIns="0">
+            <a:normAutofit/>
+          </a:bodyPr>
+          <a:p>
+            <a:endParaRPr b="0" lang="en-US" sz="3200" spc="-1" strike="noStrike">
+              <a:latin typeface="Arial"/>
+            </a:endParaRPr>
+          </a:p>
+        </p:txBody>
+      </p:sp>
+      <p:sp>
+        <p:nvSpPr>
+          <p:cNvPr id="14" name="PlaceHolder 4"/>
+          <p:cNvSpPr>
+            <a:spLocks noGrp="1"/>
+          </p:cNvSpPr>
+          <p:nvPr>
+            <p:ph type="body"/>
+          </p:nvPr>
+        </p:nvSpPr>
+        <p:spPr>
+          <a:xfrm>
+            <a:off x="503640" y="3043440"/>
+            <a:ext cx="4425480" cy="1567800"/>
           </a:xfrm>
           <a:prstGeom prst="rect">
             <a:avLst/>
@@ -1081,7 +1081,7 @@
       </p:grpSpPr>
       <p:sp>
         <p:nvSpPr>
-          <p:cNvPr id="18" name="PlaceHolder 1"/>
+          <p:cNvPr id="15" name="PlaceHolder 1"/>
           <p:cNvSpPr>
             <a:spLocks noGrp="1"/>
           </p:cNvSpPr>
@@ -1091,8 +1091,8 @@
         </p:nvSpPr>
         <p:spPr>
           <a:xfrm>
-            <a:off x="503640" y="225720"/>
-            <a:ext cx="9068760" cy="946440"/>
+            <a:off x="503640" y="226080"/>
+            <a:ext cx="9069120" cy="946080"/>
           </a:xfrm>
           <a:prstGeom prst="rect">
             <a:avLst/>
@@ -1110,7 +1110,7 @@
       </p:sp>
       <p:sp>
         <p:nvSpPr>
-          <p:cNvPr id="19" name="PlaceHolder 2"/>
+          <p:cNvPr id="16" name="PlaceHolder 2"/>
           <p:cNvSpPr>
             <a:spLocks noGrp="1"/>
           </p:cNvSpPr>
@@ -1121,26 +1121,26 @@
         <p:spPr>
           <a:xfrm>
             <a:off x="503640" y="1326240"/>
-            <a:ext cx="4425480" cy="3287880"/>
-          </a:xfrm>
-          <a:prstGeom prst="rect">
-            <a:avLst/>
-          </a:prstGeom>
-        </p:spPr>
-        <p:txBody>
-          <a:bodyPr lIns="0" rIns="0" tIns="0" bIns="0">
-            <a:normAutofit/>
-          </a:bodyPr>
-          <a:p>
-            <a:endParaRPr b="0" lang="en-US" sz="3200" spc="-1" strike="noStrike">
-              <a:latin typeface="Arial"/>
-            </a:endParaRPr>
-          </a:p>
-        </p:txBody>
-      </p:sp>
-      <p:sp>
-        <p:nvSpPr>
-          <p:cNvPr id="20" name="PlaceHolder 3"/>
+            <a:ext cx="4425480" cy="3287520"/>
+          </a:xfrm>
+          <a:prstGeom prst="rect">
+            <a:avLst/>
+          </a:prstGeom>
+        </p:spPr>
+        <p:txBody>
+          <a:bodyPr lIns="0" rIns="0" tIns="0" bIns="0">
+            <a:normAutofit/>
+          </a:bodyPr>
+          <a:p>
+            <a:endParaRPr b="0" lang="en-US" sz="3200" spc="-1" strike="noStrike">
+              <a:latin typeface="Arial"/>
+            </a:endParaRPr>
+          </a:p>
+        </p:txBody>
+      </p:sp>
+      <p:sp>
+        <p:nvSpPr>
+          <p:cNvPr id="17" name="PlaceHolder 3"/>
           <p:cNvSpPr>
             <a:spLocks noGrp="1"/>
           </p:cNvSpPr>
@@ -1151,37 +1151,37 @@
         <p:spPr>
           <a:xfrm>
             <a:off x="5150880" y="1326240"/>
-            <a:ext cx="4425480" cy="1568160"/>
-          </a:xfrm>
-          <a:prstGeom prst="rect">
-            <a:avLst/>
-          </a:prstGeom>
-        </p:spPr>
-        <p:txBody>
-          <a:bodyPr lIns="0" rIns="0" tIns="0" bIns="0">
-            <a:normAutofit/>
-          </a:bodyPr>
-          <a:p>
-            <a:endParaRPr b="0" lang="en-US" sz="3200" spc="-1" strike="noStrike">
-              <a:latin typeface="Arial"/>
-            </a:endParaRPr>
-          </a:p>
-        </p:txBody>
-      </p:sp>
-      <p:sp>
-        <p:nvSpPr>
-          <p:cNvPr id="21" name="PlaceHolder 4"/>
-          <p:cNvSpPr>
-            <a:spLocks noGrp="1"/>
-          </p:cNvSpPr>
-          <p:nvPr>
-            <p:ph type="body"/>
-          </p:nvPr>
-        </p:nvSpPr>
-        <p:spPr>
-          <a:xfrm>
-            <a:off x="5150880" y="3043800"/>
-            <a:ext cx="4425480" cy="1568160"/>
+            <a:ext cx="4425480" cy="1567800"/>
+          </a:xfrm>
+          <a:prstGeom prst="rect">
+            <a:avLst/>
+          </a:prstGeom>
+        </p:spPr>
+        <p:txBody>
+          <a:bodyPr lIns="0" rIns="0" tIns="0" bIns="0">
+            <a:normAutofit/>
+          </a:bodyPr>
+          <a:p>
+            <a:endParaRPr b="0" lang="en-US" sz="3200" spc="-1" strike="noStrike">
+              <a:latin typeface="Arial"/>
+            </a:endParaRPr>
+          </a:p>
+        </p:txBody>
+      </p:sp>
+      <p:sp>
+        <p:nvSpPr>
+          <p:cNvPr id="18" name="PlaceHolder 4"/>
+          <p:cNvSpPr>
+            <a:spLocks noGrp="1"/>
+          </p:cNvSpPr>
+          <p:nvPr>
+            <p:ph type="body"/>
+          </p:nvPr>
+        </p:nvSpPr>
+        <p:spPr>
+          <a:xfrm>
+            <a:off x="5150880" y="3043440"/>
+            <a:ext cx="4425480" cy="1567800"/>
           </a:xfrm>
           <a:prstGeom prst="rect">
             <a:avLst/>
@@ -1222,7 +1222,7 @@
       </p:grpSpPr>
       <p:sp>
         <p:nvSpPr>
-          <p:cNvPr id="22" name="PlaceHolder 1"/>
+          <p:cNvPr id="19" name="PlaceHolder 1"/>
           <p:cNvSpPr>
             <a:spLocks noGrp="1"/>
           </p:cNvSpPr>
@@ -1232,8 +1232,8 @@
         </p:nvSpPr>
         <p:spPr>
           <a:xfrm>
-            <a:off x="503640" y="225720"/>
-            <a:ext cx="9068760" cy="946440"/>
+            <a:off x="503640" y="226080"/>
+            <a:ext cx="9069120" cy="946080"/>
           </a:xfrm>
           <a:prstGeom prst="rect">
             <a:avLst/>
@@ -1251,7 +1251,7 @@
       </p:sp>
       <p:sp>
         <p:nvSpPr>
-          <p:cNvPr id="23" name="PlaceHolder 2"/>
+          <p:cNvPr id="20" name="PlaceHolder 2"/>
           <p:cNvSpPr>
             <a:spLocks noGrp="1"/>
           </p:cNvSpPr>
@@ -1262,26 +1262,26 @@
         <p:spPr>
           <a:xfrm>
             <a:off x="503640" y="1326240"/>
-            <a:ext cx="4425480" cy="1568160"/>
-          </a:xfrm>
-          <a:prstGeom prst="rect">
-            <a:avLst/>
-          </a:prstGeom>
-        </p:spPr>
-        <p:txBody>
-          <a:bodyPr lIns="0" rIns="0" tIns="0" bIns="0">
-            <a:normAutofit/>
-          </a:bodyPr>
-          <a:p>
-            <a:endParaRPr b="0" lang="en-US" sz="3200" spc="-1" strike="noStrike">
-              <a:latin typeface="Arial"/>
-            </a:endParaRPr>
-          </a:p>
-        </p:txBody>
-      </p:sp>
-      <p:sp>
-        <p:nvSpPr>
-          <p:cNvPr id="24" name="PlaceHolder 3"/>
+            <a:ext cx="4425480" cy="1567800"/>
+          </a:xfrm>
+          <a:prstGeom prst="rect">
+            <a:avLst/>
+          </a:prstGeom>
+        </p:spPr>
+        <p:txBody>
+          <a:bodyPr lIns="0" rIns="0" tIns="0" bIns="0">
+            <a:normAutofit/>
+          </a:bodyPr>
+          <a:p>
+            <a:endParaRPr b="0" lang="en-US" sz="3200" spc="-1" strike="noStrike">
+              <a:latin typeface="Arial"/>
+            </a:endParaRPr>
+          </a:p>
+        </p:txBody>
+      </p:sp>
+      <p:sp>
+        <p:nvSpPr>
+          <p:cNvPr id="21" name="PlaceHolder 3"/>
           <p:cNvSpPr>
             <a:spLocks noGrp="1"/>
           </p:cNvSpPr>
@@ -1292,37 +1292,37 @@
         <p:spPr>
           <a:xfrm>
             <a:off x="5150880" y="1326240"/>
-            <a:ext cx="4425480" cy="1568160"/>
-          </a:xfrm>
-          <a:prstGeom prst="rect">
-            <a:avLst/>
-          </a:prstGeom>
-        </p:spPr>
-        <p:txBody>
-          <a:bodyPr lIns="0" rIns="0" tIns="0" bIns="0">
-            <a:normAutofit/>
-          </a:bodyPr>
-          <a:p>
-            <a:endParaRPr b="0" lang="en-US" sz="3200" spc="-1" strike="noStrike">
-              <a:latin typeface="Arial"/>
-            </a:endParaRPr>
-          </a:p>
-        </p:txBody>
-      </p:sp>
-      <p:sp>
-        <p:nvSpPr>
-          <p:cNvPr id="25" name="PlaceHolder 4"/>
-          <p:cNvSpPr>
-            <a:spLocks noGrp="1"/>
-          </p:cNvSpPr>
-          <p:nvPr>
-            <p:ph type="body"/>
-          </p:nvPr>
-        </p:nvSpPr>
-        <p:spPr>
-          <a:xfrm>
-            <a:off x="503640" y="3043800"/>
-            <a:ext cx="9068760" cy="1568160"/>
+            <a:ext cx="4425480" cy="1567800"/>
+          </a:xfrm>
+          <a:prstGeom prst="rect">
+            <a:avLst/>
+          </a:prstGeom>
+        </p:spPr>
+        <p:txBody>
+          <a:bodyPr lIns="0" rIns="0" tIns="0" bIns="0">
+            <a:normAutofit/>
+          </a:bodyPr>
+          <a:p>
+            <a:endParaRPr b="0" lang="en-US" sz="3200" spc="-1" strike="noStrike">
+              <a:latin typeface="Arial"/>
+            </a:endParaRPr>
+          </a:p>
+        </p:txBody>
+      </p:sp>
+      <p:sp>
+        <p:nvSpPr>
+          <p:cNvPr id="22" name="PlaceHolder 4"/>
+          <p:cNvSpPr>
+            <a:spLocks noGrp="1"/>
+          </p:cNvSpPr>
+          <p:nvPr>
+            <p:ph type="body"/>
+          </p:nvPr>
+        </p:nvSpPr>
+        <p:spPr>
+          <a:xfrm>
+            <a:off x="503640" y="3043440"/>
+            <a:ext cx="9069120" cy="1567800"/>
           </a:xfrm>
           <a:prstGeom prst="rect">
             <a:avLst/>
@@ -1373,8 +1373,8 @@
         </p:nvSpPr>
         <p:spPr>
           <a:xfrm>
-            <a:off x="503640" y="225720"/>
-            <a:ext cx="9068760" cy="946440"/>
+            <a:off x="503640" y="226080"/>
+            <a:ext cx="9069120" cy="946080"/>
           </a:xfrm>
           <a:prstGeom prst="rect">
             <a:avLst/>
@@ -1409,7 +1409,7 @@
         <p:spPr>
           <a:xfrm>
             <a:off x="503640" y="1326240"/>
-            <a:ext cx="9068760" cy="3287880"/>
+            <a:ext cx="9069120" cy="3287520"/>
           </a:xfrm>
           <a:prstGeom prst="rect">
             <a:avLst/>
@@ -1422,7 +1422,7 @@
           <a:p>
             <a:pPr marL="432000" indent="-324000">
               <a:spcBef>
-                <a:spcPts val="1414"/>
+                <a:spcPts val="1417"/>
               </a:spcBef>
               <a:buClr>
                 <a:srgbClr val="000000"/>
@@ -1444,7 +1444,7 @@
           <a:p>
             <a:pPr lvl="1" marL="864000" indent="-324000">
               <a:spcBef>
-                <a:spcPts val="1131"/>
+                <a:spcPts val="1134"/>
               </a:spcBef>
               <a:buClr>
                 <a:srgbClr val="000000"/>
@@ -1466,7 +1466,7 @@
           <a:p>
             <a:pPr lvl="2" marL="1296000" indent="-288000">
               <a:spcBef>
-                <a:spcPts val="848"/>
+                <a:spcPts val="850"/>
               </a:spcBef>
               <a:buClr>
                 <a:srgbClr val="000000"/>
@@ -1488,7 +1488,7 @@
           <a:p>
             <a:pPr lvl="3" marL="1728000" indent="-216000">
               <a:spcBef>
-                <a:spcPts val="564"/>
+                <a:spcPts val="567"/>
               </a:spcBef>
               <a:buClr>
                 <a:srgbClr val="000000"/>
@@ -1510,7 +1510,7 @@
           <a:p>
             <a:pPr lvl="4" marL="2160000" indent="-216000">
               <a:spcBef>
-                <a:spcPts val="281"/>
+                <a:spcPts val="283"/>
               </a:spcBef>
               <a:buClr>
                 <a:srgbClr val="000000"/>
@@ -1532,7 +1532,7 @@
           <a:p>
             <a:pPr lvl="5" marL="2592000" indent="-216000">
               <a:spcBef>
-                <a:spcPts val="281"/>
+                <a:spcPts val="283"/>
               </a:spcBef>
               <a:buClr>
                 <a:srgbClr val="000000"/>
@@ -1554,7 +1554,7 @@
           <a:p>
             <a:pPr lvl="6" marL="3024000" indent="-216000">
               <a:spcBef>
-                <a:spcPts val="281"/>
+                <a:spcPts val="283"/>
               </a:spcBef>
               <a:buClr>
                 <a:srgbClr val="000000"/>
@@ -1571,110 +1571,6 @@
             </a:r>
             <a:endParaRPr b="0" lang="en-US" sz="2000" spc="-1" strike="noStrike">
               <a:latin typeface="Arial"/>
-            </a:endParaRPr>
-          </a:p>
-        </p:txBody>
-      </p:sp>
-      <p:sp>
-        <p:nvSpPr>
-          <p:cNvPr id="2" name="PlaceHolder 3"/>
-          <p:cNvSpPr>
-            <a:spLocks noGrp="1"/>
-          </p:cNvSpPr>
-          <p:nvPr>
-            <p:ph type="dt"/>
-          </p:nvPr>
-        </p:nvSpPr>
-        <p:spPr>
-          <a:xfrm>
-            <a:off x="503640" y="5164560"/>
-            <a:ext cx="2347560" cy="390600"/>
-          </a:xfrm>
-          <a:prstGeom prst="rect">
-            <a:avLst/>
-          </a:prstGeom>
-        </p:spPr>
-        <p:txBody>
-          <a:bodyPr lIns="0" rIns="0" tIns="0" bIns="0"/>
-          <a:p>
-            <a:r>
-              <a:rPr b="0" lang="en-US" sz="1400" spc="-1" strike="noStrike">
-                <a:latin typeface="Times New Roman"/>
-              </a:rPr>
-              <a:t>&lt;date/time&gt;</a:t>
-            </a:r>
-            <a:endParaRPr b="0" lang="en-US" sz="1400" spc="-1" strike="noStrike">
-              <a:latin typeface="Times New Roman"/>
-            </a:endParaRPr>
-          </a:p>
-        </p:txBody>
-      </p:sp>
-      <p:sp>
-        <p:nvSpPr>
-          <p:cNvPr id="3" name="PlaceHolder 4"/>
-          <p:cNvSpPr>
-            <a:spLocks noGrp="1"/>
-          </p:cNvSpPr>
-          <p:nvPr>
-            <p:ph type="ftr"/>
-          </p:nvPr>
-        </p:nvSpPr>
-        <p:spPr>
-          <a:xfrm>
-            <a:off x="3445920" y="5164560"/>
-            <a:ext cx="3193920" cy="390600"/>
-          </a:xfrm>
-          <a:prstGeom prst="rect">
-            <a:avLst/>
-          </a:prstGeom>
-        </p:spPr>
-        <p:txBody>
-          <a:bodyPr lIns="0" rIns="0" tIns="0" bIns="0"/>
-          <a:p>
-            <a:pPr algn="ctr"/>
-            <a:r>
-              <a:rPr b="0" lang="en-US" sz="1400" spc="-1" strike="noStrike">
-                <a:latin typeface="Times New Roman"/>
-              </a:rPr>
-              <a:t>&lt;footer&gt;</a:t>
-            </a:r>
-            <a:endParaRPr b="0" lang="en-US" sz="1400" spc="-1" strike="noStrike">
-              <a:latin typeface="Times New Roman"/>
-            </a:endParaRPr>
-          </a:p>
-        </p:txBody>
-      </p:sp>
-      <p:sp>
-        <p:nvSpPr>
-          <p:cNvPr id="4" name="PlaceHolder 5"/>
-          <p:cNvSpPr>
-            <a:spLocks noGrp="1"/>
-          </p:cNvSpPr>
-          <p:nvPr>
-            <p:ph type="sldNum"/>
-          </p:nvPr>
-        </p:nvSpPr>
-        <p:spPr>
-          <a:xfrm>
-            <a:off x="7224840" y="5164560"/>
-            <a:ext cx="2347560" cy="390600"/>
-          </a:xfrm>
-          <a:prstGeom prst="rect">
-            <a:avLst/>
-          </a:prstGeom>
-        </p:spPr>
-        <p:txBody>
-          <a:bodyPr lIns="0" rIns="0" tIns="0" bIns="0"/>
-          <a:p>
-            <a:pPr algn="r"/>
-            <a:fld id="{A78C0682-B618-4742-AA1B-5181C8BD553A}" type="slidenum">
-              <a:rPr b="0" lang="en-US" sz="1400" spc="-1" strike="noStrike">
-                <a:latin typeface="Times New Roman"/>
-              </a:rPr>
-              <a:t>&lt;number&gt;</a:t>
-            </a:fld>
-            <a:endParaRPr b="0" lang="en-US" sz="1400" spc="-1" strike="noStrike">
-              <a:latin typeface="Times New Roman"/>
             </a:endParaRPr>
           </a:p>
         </p:txBody>
@@ -1725,14 +1621,14 @@
       </p:grpSpPr>
       <p:sp>
         <p:nvSpPr>
-          <p:cNvPr id="41" name="TextShape 1"/>
-          <p:cNvSpPr txBox="1"/>
+          <p:cNvPr id="38" name="CustomShape 1"/>
+          <p:cNvSpPr/>
           <p:nvPr/>
         </p:nvSpPr>
         <p:spPr>
           <a:xfrm>
             <a:off x="503640" y="225720"/>
-            <a:ext cx="9068760" cy="946440"/>
+            <a:ext cx="9066600" cy="944280"/>
           </a:xfrm>
           <a:prstGeom prst="rect">
             <a:avLst/>
@@ -1742,13 +1638,27 @@
             <a:noFill/>
           </a:ln>
         </p:spPr>
+        <p:style>
+          <a:lnRef idx="0"/>
+          <a:fillRef idx="0"/>
+          <a:effectRef idx="0"/>
+          <a:fontRef idx="minor"/>
+        </p:style>
         <p:txBody>
           <a:bodyPr lIns="0" rIns="0" tIns="0" bIns="0" anchor="ctr"/>
           <a:p>
-            <a:pPr algn="ctr"/>
+            <a:pPr algn="ctr">
+              <a:lnSpc>
+                <a:spcPct val="100000"/>
+              </a:lnSpc>
+            </a:pPr>
             <a:r>
               <a:rPr b="0" lang="en-US" sz="4400" spc="-1" strike="noStrike">
+                <a:solidFill>
+                  <a:srgbClr val="ffffff"/>
+                </a:solidFill>
                 <a:latin typeface="Arial"/>
+                <a:ea typeface="DejaVu Sans"/>
               </a:rPr>
               <a:t>Course Overview</a:t>
             </a:r>
@@ -1760,14 +1670,14 @@
       </p:sp>
       <p:sp>
         <p:nvSpPr>
-          <p:cNvPr id="42" name="TextShape 2"/>
-          <p:cNvSpPr txBox="1"/>
+          <p:cNvPr id="39" name="CustomShape 2"/>
+          <p:cNvSpPr/>
           <p:nvPr/>
         </p:nvSpPr>
         <p:spPr>
           <a:xfrm>
-            <a:off x="503640" y="1326240"/>
-            <a:ext cx="9068760" cy="3287880"/>
+            <a:off x="503640" y="1171080"/>
+            <a:ext cx="9066600" cy="4222800"/>
           </a:xfrm>
           <a:prstGeom prst="rect">
             <a:avLst/>
@@ -1777,10 +1687,19 @@
             <a:noFill/>
           </a:ln>
         </p:spPr>
+        <p:style>
+          <a:lnRef idx="0"/>
+          <a:fillRef idx="0"/>
+          <a:effectRef idx="0"/>
+          <a:fontRef idx="minor"/>
+        </p:style>
         <p:txBody>
           <a:bodyPr lIns="0" rIns="0" tIns="0" bIns="0" anchor="ctr"/>
           <a:p>
-            <a:pPr marL="216000" indent="-216000">
+            <a:pPr marL="216000" indent="-213840">
+              <a:lnSpc>
+                <a:spcPct val="100000"/>
+              </a:lnSpc>
               <a:buClr>
                 <a:srgbClr val="ffffff"/>
               </a:buClr>
@@ -1790,7 +1709,11 @@
             </a:pPr>
             <a:r>
               <a:rPr b="0" lang="en-US" sz="3200" spc="-1" strike="noStrike">
+                <a:solidFill>
+                  <a:srgbClr val="ffffff"/>
+                </a:solidFill>
                 <a:latin typeface="Arial"/>
+                <a:ea typeface="DejaVu Sans"/>
               </a:rPr>
               <a:t>How can I get extra credit?</a:t>
             </a:r>
@@ -1799,7 +1722,10 @@
             </a:endParaRPr>
           </a:p>
           <a:p>
-            <a:pPr marL="216000" indent="-216000">
+            <a:pPr marL="216000" indent="-213840">
+              <a:lnSpc>
+                <a:spcPct val="100000"/>
+              </a:lnSpc>
               <a:buClr>
                 <a:srgbClr val="ffffff"/>
               </a:buClr>
@@ -1809,7 +1735,11 @@
             </a:pPr>
             <a:r>
               <a:rPr b="0" lang="en-US" sz="3200" spc="-1" strike="noStrike">
+                <a:solidFill>
+                  <a:srgbClr val="ffffff"/>
+                </a:solidFill>
                 <a:latin typeface="Arial"/>
+                <a:ea typeface="DejaVu Sans"/>
               </a:rPr>
               <a:t>What is the late work policy?</a:t>
             </a:r>
@@ -1818,7 +1748,10 @@
             </a:endParaRPr>
           </a:p>
           <a:p>
-            <a:pPr marL="216000" indent="-216000">
+            <a:pPr marL="216000" indent="-213840">
+              <a:lnSpc>
+                <a:spcPct val="100000"/>
+              </a:lnSpc>
               <a:buClr>
                 <a:srgbClr val="ffffff"/>
               </a:buClr>
@@ -1828,7 +1761,11 @@
             </a:pPr>
             <a:r>
               <a:rPr b="0" lang="en-US" sz="3200" spc="-1" strike="noStrike">
+                <a:solidFill>
+                  <a:srgbClr val="ffffff"/>
+                </a:solidFill>
                 <a:latin typeface="Arial"/>
+                <a:ea typeface="DejaVu Sans"/>
               </a:rPr>
               <a:t>What is my professor’s email address?</a:t>
             </a:r>
@@ -1837,7 +1774,10 @@
             </a:endParaRPr>
           </a:p>
           <a:p>
-            <a:pPr marL="216000" indent="-216000">
+            <a:pPr marL="216000" indent="-213840">
+              <a:lnSpc>
+                <a:spcPct val="100000"/>
+              </a:lnSpc>
               <a:buClr>
                 <a:srgbClr val="ffffff"/>
               </a:buClr>
@@ -1847,7 +1787,11 @@
             </a:pPr>
             <a:r>
               <a:rPr b="0" lang="en-US" sz="3200" spc="-1" strike="noStrike">
+                <a:solidFill>
+                  <a:srgbClr val="ffffff"/>
+                </a:solidFill>
                 <a:latin typeface="Arial"/>
+                <a:ea typeface="DejaVu Sans"/>
               </a:rPr>
               <a:t>What are the required materials?</a:t>
             </a:r>
@@ -1856,7 +1800,10 @@
             </a:endParaRPr>
           </a:p>
           <a:p>
-            <a:pPr marL="216000" indent="-216000">
+            <a:pPr marL="216000" indent="-213840">
+              <a:lnSpc>
+                <a:spcPct val="100000"/>
+              </a:lnSpc>
               <a:buClr>
                 <a:srgbClr val="ffffff"/>
               </a:buClr>
@@ -1866,7 +1813,11 @@
             </a:pPr>
             <a:r>
               <a:rPr b="0" lang="en-US" sz="3200" spc="-1" strike="noStrike">
+                <a:solidFill>
+                  <a:srgbClr val="ffffff"/>
+                </a:solidFill>
                 <a:latin typeface="Arial"/>
+                <a:ea typeface="DejaVu Sans"/>
               </a:rPr>
               <a:t>What are the major presentations?</a:t>
             </a:r>
@@ -1875,7 +1826,10 @@
             </a:endParaRPr>
           </a:p>
           <a:p>
-            <a:pPr marL="216000" indent="-216000">
+            <a:pPr marL="216000" indent="-213840">
+              <a:lnSpc>
+                <a:spcPct val="100000"/>
+              </a:lnSpc>
               <a:buClr>
                 <a:srgbClr val="ffffff"/>
               </a:buClr>
@@ -1885,16 +1839,23 @@
             </a:pPr>
             <a:r>
               <a:rPr b="0" lang="en-US" sz="3200" spc="-1" strike="noStrike">
+                <a:solidFill>
+                  <a:srgbClr val="ffffff"/>
+                </a:solidFill>
                 <a:latin typeface="Arial"/>
+                <a:ea typeface="DejaVu Sans"/>
               </a:rPr>
-              <a:t>Where does most of my grade come from?</a:t>
+              <a:t>Are there exams? When are they?</a:t>
             </a:r>
             <a:endParaRPr b="0" lang="en-US" sz="3200" spc="-1" strike="noStrike">
               <a:latin typeface="Arial"/>
             </a:endParaRPr>
           </a:p>
           <a:p>
-            <a:pPr marL="216000" indent="-216000">
+            <a:pPr marL="216000" indent="-213840">
+              <a:lnSpc>
+                <a:spcPct val="100000"/>
+              </a:lnSpc>
               <a:buClr>
                 <a:srgbClr val="ffffff"/>
               </a:buClr>
@@ -1904,7 +1865,37 @@
             </a:pPr>
             <a:r>
               <a:rPr b="0" lang="en-US" sz="3200" spc="-1" strike="noStrike">
+                <a:solidFill>
+                  <a:srgbClr val="ffffff"/>
+                </a:solidFill>
                 <a:latin typeface="Arial"/>
+                <a:ea typeface="DejaVu Sans"/>
+              </a:rPr>
+              <a:t>Where does most of my grade come from?</a:t>
+            </a:r>
+            <a:endParaRPr b="0" lang="en-US" sz="3200" spc="-1" strike="noStrike">
+              <a:latin typeface="Arial"/>
+            </a:endParaRPr>
+          </a:p>
+          <a:p>
+            <a:pPr marL="216000" indent="-213840">
+              <a:lnSpc>
+                <a:spcPct val="100000"/>
+              </a:lnSpc>
+              <a:buClr>
+                <a:srgbClr val="ffffff"/>
+              </a:buClr>
+              <a:buSzPct val="45000"/>
+              <a:buFont typeface="Wingdings" charset="2"/>
+              <a:buChar char=""/>
+            </a:pPr>
+            <a:r>
+              <a:rPr b="0" lang="en-US" sz="3200" spc="-1" strike="noStrike">
+                <a:solidFill>
+                  <a:srgbClr val="ffffff"/>
+                </a:solidFill>
+                <a:latin typeface="Arial"/>
+                <a:ea typeface="DejaVu Sans"/>
               </a:rPr>
               <a:t>How is participation assessed?</a:t>
             </a:r>

</xml_diff>